<commit_message>
Commit to back up the latest copy
</commit_message>
<xml_diff>
--- a/documents/slides/Project_Progress_20180810.pptx
+++ b/documents/slides/Project_Progress_20180810.pptx
@@ -259,7 +259,7 @@
             <a:fld id="{EA3D68A3-9B80-584C-9BEB-F8B43CF5A651}" type="datetime1">
               <a:rPr lang="en-US" sz="900" smtClean="0"/>
               <a:pPr/>
-              <a:t>8/9/18</a:t>
+              <a:t>8/10/18</a:t>
             </a:fld>
             <a:endParaRPr lang="en-US" sz="900"/>
           </a:p>
@@ -430,7 +430,7 @@
             <a:fld id="{39FEAFF0-7375-1D4A-A389-D6238357B121}" type="datetime1">
               <a:rPr lang="en-US" smtClean="0"/>
               <a:pPr/>
-              <a:t>8/9/18</a:t>
+              <a:t>8/10/18</a:t>
             </a:fld>
             <a:endParaRPr lang="en-US"/>
           </a:p>
@@ -789,7 +789,7 @@
             <a:fld id="{39FEAFF0-7375-1D4A-A389-D6238357B121}" type="datetime1">
               <a:rPr lang="en-US" smtClean="0"/>
               <a:pPr/>
-              <a:t>8/9/18</a:t>
+              <a:t>8/10/18</a:t>
             </a:fld>
             <a:endParaRPr lang="en-US"/>
           </a:p>
@@ -1005,7 +1005,7 @@
             <a:fld id="{39FEAFF0-7375-1D4A-A389-D6238357B121}" type="datetime1">
               <a:rPr lang="en-US" smtClean="0"/>
               <a:pPr/>
-              <a:t>8/9/18</a:t>
+              <a:t>8/10/18</a:t>
             </a:fld>
             <a:endParaRPr lang="en-US"/>
           </a:p>
@@ -1136,7 +1136,7 @@
             <a:fld id="{39FEAFF0-7375-1D4A-A389-D6238357B121}" type="datetime1">
               <a:rPr lang="en-US" smtClean="0"/>
               <a:pPr/>
-              <a:t>8/9/18</a:t>
+              <a:t>8/10/18</a:t>
             </a:fld>
             <a:endParaRPr lang="en-US"/>
           </a:p>
@@ -1352,7 +1352,7 @@
             <a:fld id="{39FEAFF0-7375-1D4A-A389-D6238357B121}" type="datetime1">
               <a:rPr lang="en-US" smtClean="0"/>
               <a:pPr/>
-              <a:t>8/9/18</a:t>
+              <a:t>8/10/18</a:t>
             </a:fld>
             <a:endParaRPr lang="en-US"/>
           </a:p>
@@ -1568,7 +1568,7 @@
             <a:fld id="{39FEAFF0-7375-1D4A-A389-D6238357B121}" type="datetime1">
               <a:rPr lang="en-US" smtClean="0"/>
               <a:pPr/>
-              <a:t>8/9/18</a:t>
+              <a:t>8/10/18</a:t>
             </a:fld>
             <a:endParaRPr lang="en-US"/>
           </a:p>
@@ -1655,6 +1655,14 @@
           <a:bodyPr/>
           <a:lstStyle/>
           <a:p>
+            <a:r>
+              <a:rPr lang="en-US" b="0" dirty="0"/>
+              <a:t>Show demo of the output from TensorFlow Metadata Visualizer tool by </a:t>
+            </a:r>
+            <a:r>
+              <a:rPr lang="en-US" b="0" dirty="0" err="1"/>
+              <a:t>Hadi</a:t>
+            </a:r>
             <a:endParaRPr lang="en-US" b="0" dirty="0"/>
           </a:p>
         </p:txBody>
@@ -1784,7 +1792,7 @@
             <a:fld id="{39FEAFF0-7375-1D4A-A389-D6238357B121}" type="datetime1">
               <a:rPr lang="en-US" smtClean="0"/>
               <a:pPr/>
-              <a:t>8/9/18</a:t>
+              <a:t>8/10/18</a:t>
             </a:fld>
             <a:endParaRPr lang="en-US"/>
           </a:p>
@@ -2106,7 +2114,7 @@
             <a:fld id="{D897A66F-DFB6-CB44-8B31-7FAB7C20B0C7}" type="datetime4">
               <a:rPr lang="en-US" smtClean="0"/>
               <a:pPr/>
-              <a:t>August 9, 2018</a:t>
+              <a:t>August 10, 2018</a:t>
             </a:fld>
             <a:endParaRPr lang="en-US" dirty="0"/>
           </a:p>
@@ -6425,7 +6433,7 @@
               <a:rPr lang="en-US" sz="1800" b="0" dirty="0">
                 <a:cs typeface="Avenir Book"/>
               </a:rPr>
-              <a:t>To add prefetching using TF Dataset API in HEPCNNB</a:t>
+              <a:t>To extend Google’s tool to combine the results from all the runs</a:t>
             </a:r>
           </a:p>
           <a:p>
@@ -6443,7 +6451,61 @@
               <a:rPr lang="en-US" sz="1800" b="0" dirty="0">
                 <a:cs typeface="Avenir Book"/>
               </a:rPr>
-              <a:t>To write a summary report on the project</a:t>
+              <a:t>To modify Google’s tool to segregate IO, Compute and Communication</a:t>
+            </a:r>
+          </a:p>
+          <a:p>
+            <a:pPr marL="285750">
+              <a:lnSpc>
+                <a:spcPct val="130000"/>
+              </a:lnSpc>
+              <a:buClr>
+                <a:srgbClr val="23ABE3"/>
+              </a:buClr>
+              <a:buFont typeface="Wingdings" charset="2"/>
+              <a:buChar char="Ø"/>
+            </a:pPr>
+            <a:r>
+              <a:rPr lang="en-US" sz="1800" b="0" dirty="0">
+                <a:cs typeface="Avenir Book"/>
+              </a:rPr>
+              <a:t>To modify TensorFlow’s codebase if required</a:t>
+            </a:r>
+          </a:p>
+          <a:p>
+            <a:pPr marL="285750">
+              <a:lnSpc>
+                <a:spcPct val="130000"/>
+              </a:lnSpc>
+              <a:buClr>
+                <a:srgbClr val="23ABE3"/>
+              </a:buClr>
+              <a:buFont typeface="Wingdings" charset="2"/>
+              <a:buChar char="Ø"/>
+            </a:pPr>
+            <a:r>
+              <a:rPr lang="en-US" sz="1800" b="0" dirty="0">
+                <a:cs typeface="Avenir Book"/>
+              </a:rPr>
+              <a:t>To add prefetching using TF Dataset API in HEPCNNB</a:t>
+            </a:r>
+          </a:p>
+          <a:p>
+            <a:pPr marL="285750">
+              <a:lnSpc>
+                <a:spcPct val="130000"/>
+              </a:lnSpc>
+              <a:buClr>
+                <a:srgbClr val="23ABE3"/>
+              </a:buClr>
+              <a:buFont typeface="Wingdings" charset="2"/>
+              <a:buChar char="Ø"/>
+            </a:pPr>
+            <a:r>
+              <a:rPr lang="en-US" sz="1800" b="0" dirty="0">
+                <a:cs typeface="Avenir Book"/>
+              </a:rPr>
+              <a:t>To write a summary report on the project in IEEE format</a:t>
             </a:r>
           </a:p>
           <a:p>
@@ -7091,7 +7153,7 @@
               <a:rPr lang="en-US" sz="1800" b="0" dirty="0">
                 <a:cs typeface="Avenir Book"/>
               </a:rPr>
-              <a:t>Analyzed HEPCNNB data pipeline</a:t>
+              <a:t>Analyzed HEPCNNB data pipeline and planned some optimizations</a:t>
             </a:r>
           </a:p>
           <a:p>
@@ -7401,7 +7463,106 @@
               <a:rPr lang="en-US" sz="1800" b="0" dirty="0">
                 <a:cs typeface="Avenir Book"/>
               </a:rPr>
-              <a:t>Problem with profiling parallelized data pipeline</a:t>
+              <a:t>Inability of established profiling tool like Darshan to trace HDF5-IO</a:t>
+            </a:r>
+          </a:p>
+          <a:p>
+            <a:pPr marL="285750">
+              <a:lnSpc>
+                <a:spcPct val="130000"/>
+              </a:lnSpc>
+              <a:buClr>
+                <a:srgbClr val="23ABE3"/>
+              </a:buClr>
+              <a:buFont typeface="Wingdings" charset="2"/>
+              <a:buChar char="Ø"/>
+            </a:pPr>
+            <a:r>
+              <a:rPr lang="en-US" sz="1800" b="0" dirty="0">
+                <a:cs typeface="Avenir Book"/>
+              </a:rPr>
+              <a:t>Problem with profiling parallelized data pipeline with </a:t>
+            </a:r>
+            <a:r>
+              <a:rPr lang="en-US" sz="1800" b="0" dirty="0" err="1">
+                <a:cs typeface="Avenir Book"/>
+              </a:rPr>
+              <a:t>TimeLogger</a:t>
+            </a:r>
+            <a:endParaRPr lang="en-US" sz="1800" b="0" dirty="0">
+              <a:cs typeface="Avenir Book"/>
+            </a:endParaRPr>
+          </a:p>
+          <a:p>
+            <a:pPr marL="285750">
+              <a:lnSpc>
+                <a:spcPct val="130000"/>
+              </a:lnSpc>
+              <a:buClr>
+                <a:srgbClr val="23ABE3"/>
+              </a:buClr>
+              <a:buFont typeface="Wingdings" charset="2"/>
+              <a:buChar char="Ø"/>
+            </a:pPr>
+            <a:r>
+              <a:rPr lang="en-US" sz="1800" b="0" dirty="0">
+                <a:cs typeface="Avenir Book"/>
+              </a:rPr>
+              <a:t>Problem with visualizing large Timeline </a:t>
+            </a:r>
+            <a:r>
+              <a:rPr lang="en-US" sz="1800" b="0" dirty="0" err="1">
+                <a:cs typeface="Avenir Book"/>
+              </a:rPr>
+              <a:t>json</a:t>
+            </a:r>
+            <a:r>
+              <a:rPr lang="en-US" sz="1800" b="0" dirty="0">
+                <a:cs typeface="Avenir Book"/>
+              </a:rPr>
+              <a:t> file output using chrome</a:t>
+            </a:r>
+          </a:p>
+          <a:p>
+            <a:pPr marL="285750">
+              <a:lnSpc>
+                <a:spcPct val="130000"/>
+              </a:lnSpc>
+              <a:buClr>
+                <a:srgbClr val="23ABE3"/>
+              </a:buClr>
+              <a:buFont typeface="Wingdings" charset="2"/>
+              <a:buChar char="Ø"/>
+            </a:pPr>
+            <a:r>
+              <a:rPr lang="en-US" sz="1800" b="0" dirty="0">
+                <a:cs typeface="Avenir Book"/>
+              </a:rPr>
+              <a:t>Issues with properly interpreting </a:t>
+            </a:r>
+            <a:r>
+              <a:rPr lang="en-US" sz="1800" b="0" dirty="0" err="1">
+                <a:cs typeface="Avenir Book"/>
+              </a:rPr>
+              <a:t>TensorBoard</a:t>
+            </a:r>
+            <a:r>
+              <a:rPr lang="en-US" sz="1800" b="0" dirty="0">
+                <a:cs typeface="Avenir Book"/>
+              </a:rPr>
+              <a:t> </a:t>
+            </a:r>
+            <a:r>
+              <a:rPr lang="en-US" sz="1800" b="0">
+                <a:cs typeface="Avenir Book"/>
+              </a:rPr>
+              <a:t>and Timeline </a:t>
+            </a:r>
+            <a:r>
+              <a:rPr lang="en-US" sz="1800" b="0" dirty="0">
+                <a:cs typeface="Avenir Book"/>
+              </a:rPr>
+              <a:t>results</a:t>
             </a:r>
           </a:p>
         </p:txBody>
@@ -7695,6 +7856,9 @@
               </a:rPr>
               <a:t>Digging deeper into Timeline generated metadata</a:t>
             </a:r>
+            <a:endParaRPr lang="en-US" sz="1400" b="0" dirty="0">
+              <a:cs typeface="Avenir Book"/>
+            </a:endParaRPr>
           </a:p>
           <a:p>
             <a:pPr marL="285750">
@@ -7711,7 +7875,7 @@
               <a:rPr lang="en-US" sz="1800" b="0" dirty="0">
                 <a:cs typeface="Avenir Book"/>
               </a:rPr>
-              <a:t>Exploring the visualization tool developed at Google – Demo</a:t>
+              <a:t>Exploring the visualization tool developed at Google</a:t>
             </a:r>
           </a:p>
           <a:p>

</xml_diff>